<commit_message>
pnts tile format batch table updates
</commit_message>
<xml_diff>
--- a/TileFormats/Points/figures/Figures.pptx
+++ b/TileFormats/Points/figures/Figures.pptx
@@ -5,7 +5,7 @@
     <p:sldMasterId id="2147483648" r:id="rId1"/>
   </p:sldMasterIdLst>
   <p:sldIdLst>
-    <p:sldId id="256" r:id="rId2"/>
+    <p:sldId id="257" r:id="rId2"/>
   </p:sldIdLst>
   <p:sldSz cx="9144000" cy="6858000" type="screen4x3"/>
   <p:notesSz cx="6858000" cy="9144000"/>
@@ -304,7 +304,7 @@
           <a:p>
             <a:fld id="{E44376AC-B3C2-8643-B9A3-A6905164CDF3}" type="datetimeFigureOut">
               <a:rPr lang="en-US" smtClean="0"/>
-              <a:t>11/5/2015</a:t>
+              <a:t>7/14/2016</a:t>
             </a:fld>
             <a:endParaRPr lang="en-US"/>
           </a:p>
@@ -474,7 +474,7 @@
           <a:p>
             <a:fld id="{E44376AC-B3C2-8643-B9A3-A6905164CDF3}" type="datetimeFigureOut">
               <a:rPr lang="en-US" smtClean="0"/>
-              <a:t>11/5/2015</a:t>
+              <a:t>7/14/2016</a:t>
             </a:fld>
             <a:endParaRPr lang="en-US"/>
           </a:p>
@@ -654,7 +654,7 @@
           <a:p>
             <a:fld id="{E44376AC-B3C2-8643-B9A3-A6905164CDF3}" type="datetimeFigureOut">
               <a:rPr lang="en-US" smtClean="0"/>
-              <a:t>11/5/2015</a:t>
+              <a:t>7/14/2016</a:t>
             </a:fld>
             <a:endParaRPr lang="en-US"/>
           </a:p>
@@ -824,7 +824,7 @@
           <a:p>
             <a:fld id="{E44376AC-B3C2-8643-B9A3-A6905164CDF3}" type="datetimeFigureOut">
               <a:rPr lang="en-US" smtClean="0"/>
-              <a:t>11/5/2015</a:t>
+              <a:t>7/14/2016</a:t>
             </a:fld>
             <a:endParaRPr lang="en-US"/>
           </a:p>
@@ -1070,7 +1070,7 @@
           <a:p>
             <a:fld id="{E44376AC-B3C2-8643-B9A3-A6905164CDF3}" type="datetimeFigureOut">
               <a:rPr lang="en-US" smtClean="0"/>
-              <a:t>11/5/2015</a:t>
+              <a:t>7/14/2016</a:t>
             </a:fld>
             <a:endParaRPr lang="en-US"/>
           </a:p>
@@ -1358,7 +1358,7 @@
           <a:p>
             <a:fld id="{E44376AC-B3C2-8643-B9A3-A6905164CDF3}" type="datetimeFigureOut">
               <a:rPr lang="en-US" smtClean="0"/>
-              <a:t>11/5/2015</a:t>
+              <a:t>7/14/2016</a:t>
             </a:fld>
             <a:endParaRPr lang="en-US"/>
           </a:p>
@@ -1780,7 +1780,7 @@
           <a:p>
             <a:fld id="{E44376AC-B3C2-8643-B9A3-A6905164CDF3}" type="datetimeFigureOut">
               <a:rPr lang="en-US" smtClean="0"/>
-              <a:t>11/5/2015</a:t>
+              <a:t>7/14/2016</a:t>
             </a:fld>
             <a:endParaRPr lang="en-US"/>
           </a:p>
@@ -1898,7 +1898,7 @@
           <a:p>
             <a:fld id="{E44376AC-B3C2-8643-B9A3-A6905164CDF3}" type="datetimeFigureOut">
               <a:rPr lang="en-US" smtClean="0"/>
-              <a:t>11/5/2015</a:t>
+              <a:t>7/14/2016</a:t>
             </a:fld>
             <a:endParaRPr lang="en-US"/>
           </a:p>
@@ -1993,7 +1993,7 @@
           <a:p>
             <a:fld id="{E44376AC-B3C2-8643-B9A3-A6905164CDF3}" type="datetimeFigureOut">
               <a:rPr lang="en-US" smtClean="0"/>
-              <a:t>11/5/2015</a:t>
+              <a:t>7/14/2016</a:t>
             </a:fld>
             <a:endParaRPr lang="en-US"/>
           </a:p>
@@ -2270,7 +2270,7 @@
           <a:p>
             <a:fld id="{E44376AC-B3C2-8643-B9A3-A6905164CDF3}" type="datetimeFigureOut">
               <a:rPr lang="en-US" smtClean="0"/>
-              <a:t>11/5/2015</a:t>
+              <a:t>7/14/2016</a:t>
             </a:fld>
             <a:endParaRPr lang="en-US"/>
           </a:p>
@@ -2523,7 +2523,7 @@
           <a:p>
             <a:fld id="{E44376AC-B3C2-8643-B9A3-A6905164CDF3}" type="datetimeFigureOut">
               <a:rPr lang="en-US" smtClean="0"/>
-              <a:t>11/5/2015</a:t>
+              <a:t>7/14/2016</a:t>
             </a:fld>
             <a:endParaRPr lang="en-US"/>
           </a:p>
@@ -2736,7 +2736,7 @@
           <a:p>
             <a:fld id="{E44376AC-B3C2-8643-B9A3-A6905164CDF3}" type="datetimeFigureOut">
               <a:rPr lang="en-US" smtClean="0"/>
-              <a:t>11/5/2015</a:t>
+              <a:t>7/14/2016</a:t>
             </a:fld>
             <a:endParaRPr lang="en-US"/>
           </a:p>
@@ -3119,7 +3119,7 @@
         </p:nvSpPr>
         <p:spPr>
           <a:xfrm>
-            <a:off x="109807" y="662695"/>
+            <a:off x="195825" y="668709"/>
             <a:ext cx="1846930" cy="461665"/>
           </a:xfrm>
           <a:prstGeom prst="rect">
@@ -3195,7 +3195,7 @@
         </p:nvSpPr>
         <p:spPr>
           <a:xfrm>
-            <a:off x="1956737" y="662695"/>
+            <a:off x="2042755" y="668709"/>
             <a:ext cx="923450" cy="461665"/>
           </a:xfrm>
           <a:prstGeom prst="rect">
@@ -3259,71 +3259,6 @@
           </a:p>
         </p:txBody>
       </p:sp>
-      <p:sp>
-        <p:nvSpPr>
-          <p:cNvPr id="8" name="TextBox 7"/>
-          <p:cNvSpPr txBox="1"/>
-          <p:nvPr/>
-        </p:nvSpPr>
-        <p:spPr>
-          <a:xfrm>
-            <a:off x="5303149" y="662693"/>
-            <a:ext cx="1579278" cy="461665"/>
-          </a:xfrm>
-          <a:prstGeom prst="rect">
-            <a:avLst/>
-          </a:prstGeom>
-          <a:noFill/>
-          <a:ln w="12700" cmpd="sng">
-            <a:solidFill>
-              <a:schemeClr val="tx1"/>
-            </a:solidFill>
-          </a:ln>
-        </p:spPr>
-        <p:txBody>
-          <a:bodyPr wrap="none" rtlCol="0">
-            <a:spAutoFit/>
-          </a:bodyPr>
-          <a:lstStyle/>
-          <a:p>
-            <a:pPr algn="ctr"/>
-            <a:r>
-              <a:rPr lang="en-US" sz="1200" dirty="0" smtClean="0">
-                <a:latin typeface="Courier New"/>
-                <a:cs typeface="Courier New"/>
-              </a:rPr>
-              <a:t>positions[]</a:t>
-            </a:r>
-          </a:p>
-          <a:p>
-            <a:pPr algn="ctr"/>
-            <a:r>
-              <a:rPr lang="en-US" sz="1200" dirty="0" smtClean="0">
-                <a:solidFill>
-                  <a:schemeClr val="tx2">
-                    <a:lumMod val="60000"/>
-                    <a:lumOff val="40000"/>
-                  </a:schemeClr>
-                </a:solidFill>
-                <a:latin typeface="Courier New"/>
-                <a:cs typeface="Courier New"/>
-              </a:rPr>
-              <a:t>float32 </a:t>
-            </a:r>
-            <a:r>
-              <a:rPr lang="en-US" sz="1200" dirty="0" smtClean="0">
-                <a:latin typeface="Courier New"/>
-                <a:cs typeface="Courier New"/>
-              </a:rPr>
-              <a:t>x, y, z</a:t>
-            </a:r>
-            <a:endParaRPr lang="en-US" sz="1200" dirty="0">
-              <a:latin typeface="Courier New"/>
-              <a:cs typeface="Courier New"/>
-            </a:endParaRPr>
-          </a:p>
-        </p:txBody>
-      </p:sp>
       <p:cxnSp>
         <p:nvCxnSpPr>
           <p:cNvPr id="13" name="Straight Arrow Connector 12"/>
@@ -3332,8 +3267,8 @@
         </p:nvCxnSpPr>
         <p:spPr>
           <a:xfrm>
-            <a:off x="109807" y="399926"/>
-            <a:ext cx="5185145" cy="0"/>
+            <a:off x="195825" y="405940"/>
+            <a:ext cx="5182314" cy="0"/>
           </a:xfrm>
           <a:prstGeom prst="straightConnector1">
             <a:avLst/>
@@ -3369,8 +3304,8 @@
         </p:nvSpPr>
         <p:spPr>
           <a:xfrm>
-            <a:off x="1959227" y="115812"/>
-            <a:ext cx="1486305" cy="276999"/>
+            <a:off x="1253554" y="128941"/>
+            <a:ext cx="3066865" cy="276999"/>
           </a:xfrm>
           <a:prstGeom prst="rect">
             <a:avLst/>
@@ -3393,14 +3328,83 @@
                 <a:latin typeface="Courier New"/>
                 <a:cs typeface="Courier New"/>
               </a:rPr>
-              <a:t>16-byte </a:t>
-            </a:r>
+              <a:t>24-byte header (first 16 bytes)</a:t>
+            </a:r>
+            <a:endParaRPr lang="en-US" sz="1200" dirty="0">
+              <a:latin typeface="Courier New"/>
+              <a:cs typeface="Courier New"/>
+            </a:endParaRPr>
+          </a:p>
+        </p:txBody>
+      </p:sp>
+      <p:sp>
+        <p:nvSpPr>
+          <p:cNvPr id="18" name="TextBox 17"/>
+          <p:cNvSpPr txBox="1"/>
+          <p:nvPr/>
+        </p:nvSpPr>
+        <p:spPr>
+          <a:xfrm>
+            <a:off x="195825" y="1898718"/>
+            <a:ext cx="2416046" cy="461665"/>
+          </a:xfrm>
+          <a:prstGeom prst="rect">
+            <a:avLst/>
+          </a:prstGeom>
+          <a:noFill/>
+          <a:ln w="12700" cmpd="sng">
+            <a:solidFill>
+              <a:schemeClr val="tx1"/>
+            </a:solidFill>
+          </a:ln>
+        </p:spPr>
+        <p:txBody>
+          <a:bodyPr wrap="none" rtlCol="0">
+            <a:spAutoFit/>
+          </a:bodyPr>
+          <a:lstStyle/>
+          <a:p>
+            <a:pPr algn="ctr"/>
             <a:r>
               <a:rPr lang="en-US" sz="1200" dirty="0" smtClean="0">
                 <a:latin typeface="Courier New"/>
                 <a:cs typeface="Courier New"/>
               </a:rPr>
-              <a:t>header</a:t>
+              <a:t>batchTableJSONByteLength</a:t>
+            </a:r>
+            <a:endParaRPr lang="en-US" sz="1200" dirty="0" smtClean="0">
+              <a:latin typeface="Courier New"/>
+              <a:cs typeface="Courier New"/>
+            </a:endParaRPr>
+          </a:p>
+          <a:p>
+            <a:pPr algn="ctr"/>
+            <a:r>
+              <a:rPr lang="en-US" sz="1200" dirty="0" smtClean="0">
+                <a:latin typeface="Courier New"/>
+                <a:cs typeface="Courier New"/>
+              </a:rPr>
+              <a:t>(</a:t>
+            </a:r>
+            <a:r>
+              <a:rPr lang="en-US" sz="1200" dirty="0" smtClean="0">
+                <a:solidFill>
+                  <a:schemeClr val="tx2">
+                    <a:lumMod val="60000"/>
+                    <a:lumOff val="40000"/>
+                  </a:schemeClr>
+                </a:solidFill>
+                <a:latin typeface="Courier New"/>
+                <a:cs typeface="Courier New"/>
+              </a:rPr>
+              <a:t>uint32</a:t>
+            </a:r>
+            <a:r>
+              <a:rPr lang="en-US" sz="1200" dirty="0" smtClean="0">
+                <a:latin typeface="Courier New"/>
+                <a:cs typeface="Courier New"/>
+              </a:rPr>
+              <a:t>)</a:t>
             </a:r>
             <a:endParaRPr lang="en-US" sz="1200" dirty="0">
               <a:latin typeface="Courier New"/>
@@ -3411,13 +3415,135 @@
       </p:sp>
       <p:sp>
         <p:nvSpPr>
-          <p:cNvPr id="18" name="TextBox 17"/>
+          <p:cNvPr id="19" name="TextBox 18"/>
           <p:cNvSpPr txBox="1"/>
           <p:nvPr/>
         </p:nvSpPr>
         <p:spPr>
           <a:xfrm>
-            <a:off x="3994595" y="662693"/>
+            <a:off x="81281" y="3446530"/>
+            <a:ext cx="1486305" cy="461665"/>
+          </a:xfrm>
+          <a:prstGeom prst="rect">
+            <a:avLst/>
+          </a:prstGeom>
+          <a:noFill/>
+          <a:ln w="12700" cmpd="sng">
+            <a:solidFill>
+              <a:schemeClr val="tx1"/>
+            </a:solidFill>
+            <a:prstDash val="lgDash"/>
+          </a:ln>
+        </p:spPr>
+        <p:txBody>
+          <a:bodyPr wrap="none" rtlCol="0">
+            <a:spAutoFit/>
+          </a:bodyPr>
+          <a:lstStyle/>
+          <a:p>
+            <a:pPr algn="ctr"/>
+            <a:r>
+              <a:rPr lang="en-US" sz="1200" dirty="0" err="1" smtClean="0">
+                <a:latin typeface="Courier New"/>
+                <a:cs typeface="Courier New"/>
+              </a:rPr>
+              <a:t>batchTableJSON</a:t>
+            </a:r>
+            <a:endParaRPr lang="en-US" sz="1200" dirty="0" smtClean="0">
+              <a:latin typeface="Courier New"/>
+              <a:cs typeface="Courier New"/>
+            </a:endParaRPr>
+          </a:p>
+          <a:p>
+            <a:pPr algn="ctr"/>
+            <a:endParaRPr lang="en-US" sz="1200" dirty="0">
+              <a:latin typeface="Courier New"/>
+              <a:cs typeface="Courier New"/>
+            </a:endParaRPr>
+          </a:p>
+        </p:txBody>
+      </p:sp>
+      <p:sp>
+        <p:nvSpPr>
+          <p:cNvPr id="12" name="TextBox 11"/>
+          <p:cNvSpPr txBox="1"/>
+          <p:nvPr/>
+        </p:nvSpPr>
+        <p:spPr>
+          <a:xfrm>
+            <a:off x="2966205" y="668709"/>
+            <a:ext cx="1114408" cy="461665"/>
+          </a:xfrm>
+          <a:prstGeom prst="rect">
+            <a:avLst/>
+          </a:prstGeom>
+          <a:noFill/>
+          <a:ln w="12700" cmpd="sng">
+            <a:solidFill>
+              <a:schemeClr val="tx1"/>
+            </a:solidFill>
+          </a:ln>
+        </p:spPr>
+        <p:txBody>
+          <a:bodyPr wrap="none" rtlCol="0">
+            <a:spAutoFit/>
+          </a:bodyPr>
+          <a:lstStyle/>
+          <a:p>
+            <a:pPr algn="ctr"/>
+            <a:r>
+              <a:rPr lang="en-US" sz="1200" dirty="0" smtClean="0">
+                <a:latin typeface="Courier New"/>
+                <a:cs typeface="Courier New"/>
+              </a:rPr>
+              <a:t>byteLength</a:t>
+            </a:r>
+          </a:p>
+          <a:p>
+            <a:pPr algn="ctr"/>
+            <a:r>
+              <a:rPr lang="en-US" sz="1200" dirty="0" smtClean="0">
+                <a:latin typeface="Courier New"/>
+                <a:cs typeface="Courier New"/>
+              </a:rPr>
+              <a:t>(</a:t>
+            </a:r>
+            <a:r>
+              <a:rPr lang="en-US" sz="1200" dirty="0" smtClean="0">
+                <a:solidFill>
+                  <a:schemeClr val="tx2">
+                    <a:lumMod val="60000"/>
+                    <a:lumOff val="40000"/>
+                  </a:schemeClr>
+                </a:solidFill>
+                <a:latin typeface="Courier New"/>
+                <a:cs typeface="Courier New"/>
+              </a:rPr>
+              <a:t>uint32</a:t>
+            </a:r>
+            <a:r>
+              <a:rPr lang="en-US" sz="1200" dirty="0" smtClean="0">
+                <a:latin typeface="Courier New"/>
+                <a:cs typeface="Courier New"/>
+              </a:rPr>
+              <a:t>)</a:t>
+            </a:r>
+            <a:endParaRPr lang="en-US" sz="1200" dirty="0">
+              <a:latin typeface="Courier New"/>
+              <a:cs typeface="Courier New"/>
+            </a:endParaRPr>
+          </a:p>
+        </p:txBody>
+      </p:sp>
+      <p:sp>
+        <p:nvSpPr>
+          <p:cNvPr id="15" name="TextBox 14"/>
+          <p:cNvSpPr txBox="1"/>
+          <p:nvPr/>
+        </p:nvSpPr>
+        <p:spPr>
+          <a:xfrm>
+            <a:off x="4077782" y="668709"/>
             <a:ext cx="1300357" cy="461665"/>
           </a:xfrm>
           <a:prstGeom prst="rect">
@@ -3485,15 +3611,158 @@
           </a:p>
         </p:txBody>
       </p:sp>
-      <p:sp>
-        <p:nvSpPr>
-          <p:cNvPr id="12" name="TextBox 11"/>
+      <p:cxnSp>
+        <p:nvCxnSpPr>
+          <p:cNvPr id="16" name="Straight Arrow Connector 15"/>
+          <p:cNvCxnSpPr/>
+          <p:nvPr/>
+        </p:nvCxnSpPr>
+        <p:spPr>
+          <a:xfrm>
+            <a:off x="81281" y="3181496"/>
+            <a:ext cx="5763877" cy="0"/>
+          </a:xfrm>
+          <a:prstGeom prst="straightConnector1">
+            <a:avLst/>
+          </a:prstGeom>
+          <a:ln w="12700" cmpd="sng">
+            <a:solidFill>
+              <a:schemeClr val="tx1"/>
+            </a:solidFill>
+            <a:headEnd type="arrow"/>
+            <a:tailEnd type="arrow"/>
+          </a:ln>
+        </p:spPr>
+        <p:style>
+          <a:lnRef idx="2">
+            <a:schemeClr val="accent1"/>
+          </a:lnRef>
+          <a:fillRef idx="0">
+            <a:schemeClr val="accent1"/>
+          </a:fillRef>
+          <a:effectRef idx="1">
+            <a:schemeClr val="accent1"/>
+          </a:effectRef>
+          <a:fontRef idx="minor">
+            <a:schemeClr val="tx1"/>
+          </a:fontRef>
+        </p:style>
+      </p:cxnSp>
+      <p:sp>
+        <p:nvSpPr>
+          <p:cNvPr id="17" name="TextBox 16"/>
           <p:cNvSpPr txBox="1"/>
           <p:nvPr/>
         </p:nvSpPr>
         <p:spPr>
           <a:xfrm>
-            <a:off x="6877731" y="662693"/>
+            <a:off x="2684938" y="2842000"/>
+            <a:ext cx="556563" cy="276999"/>
+          </a:xfrm>
+          <a:prstGeom prst="rect">
+            <a:avLst/>
+          </a:prstGeom>
+          <a:noFill/>
+          <a:ln w="12700" cmpd="sng">
+            <a:noFill/>
+            <a:prstDash val="lgDash"/>
+          </a:ln>
+        </p:spPr>
+        <p:txBody>
+          <a:bodyPr wrap="square" rtlCol="0">
+            <a:spAutoFit/>
+          </a:bodyPr>
+          <a:lstStyle/>
+          <a:p>
+            <a:pPr algn="ctr"/>
+            <a:r>
+              <a:rPr lang="en-US" sz="1200" dirty="0" smtClean="0">
+                <a:latin typeface="Courier New"/>
+                <a:cs typeface="Courier New"/>
+              </a:rPr>
+              <a:t>body</a:t>
+            </a:r>
+            <a:endParaRPr lang="en-US" sz="1200" dirty="0">
+              <a:latin typeface="Courier New"/>
+              <a:cs typeface="Courier New"/>
+            </a:endParaRPr>
+          </a:p>
+        </p:txBody>
+      </p:sp>
+      <p:sp>
+        <p:nvSpPr>
+          <p:cNvPr id="20" name="TextBox 19"/>
+          <p:cNvSpPr txBox="1"/>
+          <p:nvPr/>
+        </p:nvSpPr>
+        <p:spPr>
+          <a:xfrm>
+            <a:off x="3250082" y="3446530"/>
+            <a:ext cx="1579278" cy="461665"/>
+          </a:xfrm>
+          <a:prstGeom prst="rect">
+            <a:avLst/>
+          </a:prstGeom>
+          <a:noFill/>
+          <a:ln w="12700" cmpd="sng">
+            <a:solidFill>
+              <a:schemeClr val="tx1"/>
+            </a:solidFill>
+          </a:ln>
+        </p:spPr>
+        <p:txBody>
+          <a:bodyPr wrap="none" rtlCol="0">
+            <a:spAutoFit/>
+          </a:bodyPr>
+          <a:lstStyle/>
+          <a:p>
+            <a:pPr algn="ctr"/>
+            <a:r>
+              <a:rPr lang="en-US" sz="1200" dirty="0" smtClean="0">
+                <a:latin typeface="Courier New"/>
+                <a:cs typeface="Courier New"/>
+              </a:rPr>
+              <a:t>positions[]</a:t>
+            </a:r>
+          </a:p>
+          <a:p>
+            <a:pPr algn="ctr"/>
+            <a:r>
+              <a:rPr lang="en-US" sz="1200" dirty="0" smtClean="0">
+                <a:solidFill>
+                  <a:schemeClr val="tx2">
+                    <a:lumMod val="60000"/>
+                    <a:lumOff val="40000"/>
+                  </a:schemeClr>
+                </a:solidFill>
+                <a:latin typeface="Courier New"/>
+                <a:cs typeface="Courier New"/>
+              </a:rPr>
+              <a:t>float32 </a:t>
+            </a:r>
+            <a:r>
+              <a:rPr lang="en-US" sz="1200" dirty="0" smtClean="0">
+                <a:latin typeface="Courier New"/>
+                <a:cs typeface="Courier New"/>
+              </a:rPr>
+              <a:t>x, y, z</a:t>
+            </a:r>
+            <a:endParaRPr lang="en-US" sz="1200" dirty="0">
+              <a:latin typeface="Courier New"/>
+              <a:cs typeface="Courier New"/>
+            </a:endParaRPr>
+          </a:p>
+        </p:txBody>
+      </p:sp>
+      <p:sp>
+        <p:nvSpPr>
+          <p:cNvPr id="22" name="TextBox 21"/>
+          <p:cNvSpPr txBox="1"/>
+          <p:nvPr/>
+        </p:nvSpPr>
+        <p:spPr>
+          <a:xfrm>
+            <a:off x="4829360" y="3446530"/>
             <a:ext cx="1015798" cy="461665"/>
           </a:xfrm>
           <a:prstGeom prst="rect">
@@ -3552,14 +3821,14 @@
       </p:sp>
       <p:sp>
         <p:nvSpPr>
-          <p:cNvPr id="9" name="TextBox 8"/>
+          <p:cNvPr id="23" name="TextBox 22"/>
           <p:cNvSpPr txBox="1"/>
           <p:nvPr/>
         </p:nvSpPr>
         <p:spPr>
           <a:xfrm>
-            <a:off x="2880187" y="662694"/>
-            <a:ext cx="1114408" cy="461665"/>
+            <a:off x="2611871" y="1898718"/>
+            <a:ext cx="2601995" cy="461665"/>
           </a:xfrm>
           <a:prstGeom prst="rect">
             <a:avLst/>
@@ -3583,7 +3852,7 @@
                 <a:latin typeface="Courier New"/>
                 <a:cs typeface="Courier New"/>
               </a:rPr>
-              <a:t>byteLength</a:t>
+              <a:t>batchTableBinaryByteLength</a:t>
             </a:r>
             <a:endParaRPr lang="en-US" sz="1200" dirty="0" smtClean="0">
               <a:latin typeface="Courier New"/>
@@ -3626,10 +3895,145 @@
           </a:p>
         </p:txBody>
       </p:sp>
+      <p:cxnSp>
+        <p:nvCxnSpPr>
+          <p:cNvPr id="24" name="Straight Arrow Connector 23"/>
+          <p:cNvCxnSpPr/>
+          <p:nvPr/>
+        </p:nvCxnSpPr>
+        <p:spPr>
+          <a:xfrm>
+            <a:off x="194750" y="1704068"/>
+            <a:ext cx="5019116" cy="0"/>
+          </a:xfrm>
+          <a:prstGeom prst="straightConnector1">
+            <a:avLst/>
+          </a:prstGeom>
+          <a:ln w="12700" cmpd="sng">
+            <a:solidFill>
+              <a:schemeClr val="tx1"/>
+            </a:solidFill>
+            <a:headEnd type="arrow"/>
+            <a:tailEnd type="arrow"/>
+          </a:ln>
+        </p:spPr>
+        <p:style>
+          <a:lnRef idx="2">
+            <a:schemeClr val="accent1"/>
+          </a:lnRef>
+          <a:fillRef idx="0">
+            <a:schemeClr val="accent1"/>
+          </a:fillRef>
+          <a:effectRef idx="1">
+            <a:schemeClr val="accent1"/>
+          </a:effectRef>
+          <a:fontRef idx="minor">
+            <a:schemeClr val="tx1"/>
+          </a:fontRef>
+        </p:style>
+      </p:cxnSp>
+      <p:sp>
+        <p:nvSpPr>
+          <p:cNvPr id="25" name="TextBox 24"/>
+          <p:cNvSpPr txBox="1"/>
+          <p:nvPr/>
+        </p:nvSpPr>
+        <p:spPr>
+          <a:xfrm>
+            <a:off x="1345452" y="1427069"/>
+            <a:ext cx="2880918" cy="276999"/>
+          </a:xfrm>
+          <a:prstGeom prst="rect">
+            <a:avLst/>
+          </a:prstGeom>
+          <a:noFill/>
+          <a:ln w="12700" cmpd="sng">
+            <a:noFill/>
+            <a:prstDash val="lgDash"/>
+          </a:ln>
+        </p:spPr>
+        <p:txBody>
+          <a:bodyPr wrap="none" rtlCol="0">
+            <a:spAutoFit/>
+          </a:bodyPr>
+          <a:lstStyle/>
+          <a:p>
+            <a:pPr algn="ctr"/>
+            <a:r>
+              <a:rPr lang="en-US" sz="1200" dirty="0">
+                <a:latin typeface="Courier New"/>
+                <a:cs typeface="Courier New"/>
+              </a:rPr>
+              <a:t>24-byte header </a:t>
+            </a:r>
+            <a:r>
+              <a:rPr lang="en-US" sz="1200" dirty="0" smtClean="0">
+                <a:latin typeface="Courier New"/>
+                <a:cs typeface="Courier New"/>
+              </a:rPr>
+              <a:t>(next 8 bytes)</a:t>
+            </a:r>
+            <a:endParaRPr lang="en-US" sz="1200" dirty="0">
+              <a:latin typeface="Courier New"/>
+              <a:cs typeface="Courier New"/>
+            </a:endParaRPr>
+          </a:p>
+        </p:txBody>
+      </p:sp>
+      <p:sp>
+        <p:nvSpPr>
+          <p:cNvPr id="26" name="TextBox 25"/>
+          <p:cNvSpPr txBox="1"/>
+          <p:nvPr/>
+        </p:nvSpPr>
+        <p:spPr>
+          <a:xfrm>
+            <a:off x="1577829" y="3446529"/>
+            <a:ext cx="1672253" cy="461665"/>
+          </a:xfrm>
+          <a:prstGeom prst="rect">
+            <a:avLst/>
+          </a:prstGeom>
+          <a:noFill/>
+          <a:ln w="12700" cmpd="sng">
+            <a:solidFill>
+              <a:schemeClr val="tx1"/>
+            </a:solidFill>
+            <a:prstDash val="lgDash"/>
+          </a:ln>
+        </p:spPr>
+        <p:txBody>
+          <a:bodyPr wrap="none" rtlCol="0">
+            <a:spAutoFit/>
+          </a:bodyPr>
+          <a:lstStyle/>
+          <a:p>
+            <a:pPr algn="ctr"/>
+            <a:r>
+              <a:rPr lang="en-US" sz="1200" dirty="0" err="1" smtClean="0">
+                <a:latin typeface="Courier New"/>
+                <a:cs typeface="Courier New"/>
+              </a:rPr>
+              <a:t>batchTableBinary</a:t>
+            </a:r>
+            <a:endParaRPr lang="en-US" sz="1200" dirty="0" smtClean="0">
+              <a:latin typeface="Courier New"/>
+              <a:cs typeface="Courier New"/>
+            </a:endParaRPr>
+          </a:p>
+          <a:p>
+            <a:pPr algn="ctr"/>
+            <a:endParaRPr lang="en-US" sz="1200" dirty="0">
+              <a:latin typeface="Courier New"/>
+              <a:cs typeface="Courier New"/>
+            </a:endParaRPr>
+          </a:p>
+        </p:txBody>
+      </p:sp>
     </p:spTree>
     <p:extLst>
       <p:ext uri="{BB962C8B-B14F-4D97-AF65-F5344CB8AC3E}">
-        <p14:creationId xmlns:p14="http://schemas.microsoft.com/office/powerpoint/2010/main" val="3133754376"/>
+        <p14:creationId xmlns:p14="http://schemas.microsoft.com/office/powerpoint/2010/main" val="3857407651"/>
       </p:ext>
     </p:extLst>
   </p:cSld>

</xml_diff>

<commit_message>
Initial draft for points
</commit_message>
<xml_diff>
--- a/TileFormats/Points/figures/Figures.pptx
+++ b/TileFormats/Points/figures/Figures.pptx
@@ -7,7 +7,7 @@
   <p:sldIdLst>
     <p:sldId id="257" r:id="rId2"/>
   </p:sldIdLst>
-  <p:sldSz cx="9144000" cy="6858000" type="screen4x3"/>
+  <p:sldSz cx="10058400" cy="6858000"/>
   <p:notesSz cx="6858000" cy="9144000"/>
   <p:defaultTextStyle>
     <a:defPPr>
@@ -107,12 +107,12 @@
   <p:extLst>
     <p:ext uri="{EFAFB233-063F-42B5-8137-9DF3F51BA10A}">
       <p15:sldGuideLst xmlns:p15="http://schemas.microsoft.com/office/powerpoint/2012/main">
-        <p15:guide id="1" orient="horz" pos="2160">
+        <p15:guide id="1" orient="horz" pos="2160" userDrawn="1">
           <p15:clr>
             <a:srgbClr val="A4A3A4"/>
           </p15:clr>
         </p15:guide>
-        <p15:guide id="2" pos="2880">
+        <p15:guide id="2" pos="3168" userDrawn="1">
           <p15:clr>
             <a:srgbClr val="A4A3A4"/>
           </p15:clr>
@@ -152,8 +152,8 @@
         </p:nvSpPr>
         <p:spPr>
           <a:xfrm>
-            <a:off x="685800" y="2130425"/>
-            <a:ext cx="7772400" cy="1470025"/>
+            <a:off x="754380" y="2130428"/>
+            <a:ext cx="8549640" cy="1470025"/>
           </a:xfrm>
         </p:spPr>
         <p:txBody>
@@ -180,8 +180,8 @@
         </p:nvSpPr>
         <p:spPr>
           <a:xfrm>
-            <a:off x="1371600" y="3886200"/>
-            <a:ext cx="6400800" cy="1752600"/>
+            <a:off x="1508760" y="3886200"/>
+            <a:ext cx="7040880" cy="1752600"/>
           </a:xfrm>
         </p:spPr>
         <p:txBody>
@@ -304,7 +304,7 @@
           <a:p>
             <a:fld id="{E44376AC-B3C2-8643-B9A3-A6905164CDF3}" type="datetimeFigureOut">
               <a:rPr lang="en-US" smtClean="0"/>
-              <a:t>7/14/2016</a:t>
+              <a:t>8/18/2016</a:t>
             </a:fld>
             <a:endParaRPr lang="en-US"/>
           </a:p>
@@ -474,7 +474,7 @@
           <a:p>
             <a:fld id="{E44376AC-B3C2-8643-B9A3-A6905164CDF3}" type="datetimeFigureOut">
               <a:rPr lang="en-US" smtClean="0"/>
-              <a:t>7/14/2016</a:t>
+              <a:t>8/18/2016</a:t>
             </a:fld>
             <a:endParaRPr lang="en-US"/>
           </a:p>
@@ -564,8 +564,8 @@
         </p:nvSpPr>
         <p:spPr>
           <a:xfrm>
-            <a:off x="6629400" y="274638"/>
-            <a:ext cx="2057400" cy="5851525"/>
+            <a:off x="7292340" y="274641"/>
+            <a:ext cx="2263140" cy="5851525"/>
           </a:xfrm>
         </p:spPr>
         <p:txBody>
@@ -592,8 +592,8 @@
         </p:nvSpPr>
         <p:spPr>
           <a:xfrm>
-            <a:off x="457200" y="274638"/>
-            <a:ext cx="6019800" cy="5851525"/>
+            <a:off x="502920" y="274641"/>
+            <a:ext cx="6621780" cy="5851525"/>
           </a:xfrm>
         </p:spPr>
         <p:txBody>
@@ -654,7 +654,7 @@
           <a:p>
             <a:fld id="{E44376AC-B3C2-8643-B9A3-A6905164CDF3}" type="datetimeFigureOut">
               <a:rPr lang="en-US" smtClean="0"/>
-              <a:t>7/14/2016</a:t>
+              <a:t>8/18/2016</a:t>
             </a:fld>
             <a:endParaRPr lang="en-US"/>
           </a:p>
@@ -824,7 +824,7 @@
           <a:p>
             <a:fld id="{E44376AC-B3C2-8643-B9A3-A6905164CDF3}" type="datetimeFigureOut">
               <a:rPr lang="en-US" smtClean="0"/>
-              <a:t>7/14/2016</a:t>
+              <a:t>8/18/2016</a:t>
             </a:fld>
             <a:endParaRPr lang="en-US"/>
           </a:p>
@@ -914,8 +914,8 @@
         </p:nvSpPr>
         <p:spPr>
           <a:xfrm>
-            <a:off x="722313" y="4406900"/>
-            <a:ext cx="7772400" cy="1362075"/>
+            <a:off x="794544" y="4406903"/>
+            <a:ext cx="8549640" cy="1362075"/>
           </a:xfrm>
         </p:spPr>
         <p:txBody>
@@ -946,8 +946,8 @@
         </p:nvSpPr>
         <p:spPr>
           <a:xfrm>
-            <a:off x="722313" y="2906713"/>
-            <a:ext cx="7772400" cy="1500187"/>
+            <a:off x="794544" y="2906713"/>
+            <a:ext cx="8549640" cy="1500187"/>
           </a:xfrm>
         </p:spPr>
         <p:txBody>
@@ -1070,7 +1070,7 @@
           <a:p>
             <a:fld id="{E44376AC-B3C2-8643-B9A3-A6905164CDF3}" type="datetimeFigureOut">
               <a:rPr lang="en-US" smtClean="0"/>
-              <a:t>7/14/2016</a:t>
+              <a:t>8/18/2016</a:t>
             </a:fld>
             <a:endParaRPr lang="en-US"/>
           </a:p>
@@ -1183,8 +1183,8 @@
         </p:nvSpPr>
         <p:spPr>
           <a:xfrm>
-            <a:off x="457200" y="1600200"/>
-            <a:ext cx="4038600" cy="4525963"/>
+            <a:off x="502920" y="1600203"/>
+            <a:ext cx="4442460" cy="4525963"/>
           </a:xfrm>
         </p:spPr>
         <p:txBody>
@@ -1268,8 +1268,8 @@
         </p:nvSpPr>
         <p:spPr>
           <a:xfrm>
-            <a:off x="4648200" y="1600200"/>
-            <a:ext cx="4038600" cy="4525963"/>
+            <a:off x="5113020" y="1600203"/>
+            <a:ext cx="4442460" cy="4525963"/>
           </a:xfrm>
         </p:spPr>
         <p:txBody>
@@ -1358,7 +1358,7 @@
           <a:p>
             <a:fld id="{E44376AC-B3C2-8643-B9A3-A6905164CDF3}" type="datetimeFigureOut">
               <a:rPr lang="en-US" smtClean="0"/>
-              <a:t>7/14/2016</a:t>
+              <a:t>8/18/2016</a:t>
             </a:fld>
             <a:endParaRPr lang="en-US"/>
           </a:p>
@@ -1475,8 +1475,8 @@
         </p:nvSpPr>
         <p:spPr>
           <a:xfrm>
-            <a:off x="457200" y="1535113"/>
-            <a:ext cx="4040188" cy="639762"/>
+            <a:off x="502921" y="1535113"/>
+            <a:ext cx="4444207" cy="639762"/>
           </a:xfrm>
         </p:spPr>
         <p:txBody>
@@ -1540,8 +1540,8 @@
         </p:nvSpPr>
         <p:spPr>
           <a:xfrm>
-            <a:off x="457200" y="2174875"/>
-            <a:ext cx="4040188" cy="3951288"/>
+            <a:off x="502921" y="2174875"/>
+            <a:ext cx="4444207" cy="3951288"/>
           </a:xfrm>
         </p:spPr>
         <p:txBody>
@@ -1625,8 +1625,8 @@
         </p:nvSpPr>
         <p:spPr>
           <a:xfrm>
-            <a:off x="4645025" y="1535113"/>
-            <a:ext cx="4041775" cy="639762"/>
+            <a:off x="5109529" y="1535113"/>
+            <a:ext cx="4445953" cy="639762"/>
           </a:xfrm>
         </p:spPr>
         <p:txBody>
@@ -1690,8 +1690,8 @@
         </p:nvSpPr>
         <p:spPr>
           <a:xfrm>
-            <a:off x="4645025" y="2174875"/>
-            <a:ext cx="4041775" cy="3951288"/>
+            <a:off x="5109529" y="2174875"/>
+            <a:ext cx="4445953" cy="3951288"/>
           </a:xfrm>
         </p:spPr>
         <p:txBody>
@@ -1780,7 +1780,7 @@
           <a:p>
             <a:fld id="{E44376AC-B3C2-8643-B9A3-A6905164CDF3}" type="datetimeFigureOut">
               <a:rPr lang="en-US" smtClean="0"/>
-              <a:t>7/14/2016</a:t>
+              <a:t>8/18/2016</a:t>
             </a:fld>
             <a:endParaRPr lang="en-US"/>
           </a:p>
@@ -1898,7 +1898,7 @@
           <a:p>
             <a:fld id="{E44376AC-B3C2-8643-B9A3-A6905164CDF3}" type="datetimeFigureOut">
               <a:rPr lang="en-US" smtClean="0"/>
-              <a:t>7/14/2016</a:t>
+              <a:t>8/18/2016</a:t>
             </a:fld>
             <a:endParaRPr lang="en-US"/>
           </a:p>
@@ -1993,7 +1993,7 @@
           <a:p>
             <a:fld id="{E44376AC-B3C2-8643-B9A3-A6905164CDF3}" type="datetimeFigureOut">
               <a:rPr lang="en-US" smtClean="0"/>
-              <a:t>7/14/2016</a:t>
+              <a:t>8/18/2016</a:t>
             </a:fld>
             <a:endParaRPr lang="en-US"/>
           </a:p>
@@ -2083,8 +2083,8 @@
         </p:nvSpPr>
         <p:spPr>
           <a:xfrm>
-            <a:off x="457200" y="273050"/>
-            <a:ext cx="3008313" cy="1162050"/>
+            <a:off x="502922" y="273050"/>
+            <a:ext cx="3309144" cy="1162050"/>
           </a:xfrm>
         </p:spPr>
         <p:txBody>
@@ -2115,8 +2115,8 @@
         </p:nvSpPr>
         <p:spPr>
           <a:xfrm>
-            <a:off x="3575050" y="273050"/>
-            <a:ext cx="5111750" cy="5853113"/>
+            <a:off x="3932555" y="273053"/>
+            <a:ext cx="5622925" cy="5853113"/>
           </a:xfrm>
         </p:spPr>
         <p:txBody>
@@ -2200,8 +2200,8 @@
         </p:nvSpPr>
         <p:spPr>
           <a:xfrm>
-            <a:off x="457200" y="1435100"/>
-            <a:ext cx="3008313" cy="4691063"/>
+            <a:off x="502922" y="1435103"/>
+            <a:ext cx="3309144" cy="4691063"/>
           </a:xfrm>
         </p:spPr>
         <p:txBody>
@@ -2270,7 +2270,7 @@
           <a:p>
             <a:fld id="{E44376AC-B3C2-8643-B9A3-A6905164CDF3}" type="datetimeFigureOut">
               <a:rPr lang="en-US" smtClean="0"/>
-              <a:t>7/14/2016</a:t>
+              <a:t>8/18/2016</a:t>
             </a:fld>
             <a:endParaRPr lang="en-US"/>
           </a:p>
@@ -2360,8 +2360,8 @@
         </p:nvSpPr>
         <p:spPr>
           <a:xfrm>
-            <a:off x="1792288" y="4800600"/>
-            <a:ext cx="5486400" cy="566738"/>
+            <a:off x="1971517" y="4800600"/>
+            <a:ext cx="6035040" cy="566738"/>
           </a:xfrm>
         </p:spPr>
         <p:txBody>
@@ -2392,8 +2392,8 @@
         </p:nvSpPr>
         <p:spPr>
           <a:xfrm>
-            <a:off x="1792288" y="612775"/>
-            <a:ext cx="5486400" cy="4114800"/>
+            <a:off x="1971517" y="612775"/>
+            <a:ext cx="6035040" cy="4114800"/>
           </a:xfrm>
         </p:spPr>
         <p:txBody>
@@ -2453,8 +2453,8 @@
         </p:nvSpPr>
         <p:spPr>
           <a:xfrm>
-            <a:off x="1792288" y="5367338"/>
-            <a:ext cx="5486400" cy="804862"/>
+            <a:off x="1971517" y="5367338"/>
+            <a:ext cx="6035040" cy="804862"/>
           </a:xfrm>
         </p:spPr>
         <p:txBody>
@@ -2523,7 +2523,7 @@
           <a:p>
             <a:fld id="{E44376AC-B3C2-8643-B9A3-A6905164CDF3}" type="datetimeFigureOut">
               <a:rPr lang="en-US" smtClean="0"/>
-              <a:t>7/14/2016</a:t>
+              <a:t>8/18/2016</a:t>
             </a:fld>
             <a:endParaRPr lang="en-US"/>
           </a:p>
@@ -2618,8 +2618,8 @@
         </p:nvSpPr>
         <p:spPr>
           <a:xfrm>
-            <a:off x="457200" y="274638"/>
-            <a:ext cx="8229600" cy="1143000"/>
+            <a:off x="502920" y="274638"/>
+            <a:ext cx="9052560" cy="1143000"/>
           </a:xfrm>
           <a:prstGeom prst="rect">
             <a:avLst/>
@@ -2651,8 +2651,8 @@
         </p:nvSpPr>
         <p:spPr>
           <a:xfrm>
-            <a:off x="457200" y="1600200"/>
-            <a:ext cx="8229600" cy="4525963"/>
+            <a:off x="502920" y="1600203"/>
+            <a:ext cx="9052560" cy="4525963"/>
           </a:xfrm>
           <a:prstGeom prst="rect">
             <a:avLst/>
@@ -2713,8 +2713,8 @@
         </p:nvSpPr>
         <p:spPr>
           <a:xfrm>
-            <a:off x="457200" y="6356350"/>
-            <a:ext cx="2133600" cy="365125"/>
+            <a:off x="502920" y="6356353"/>
+            <a:ext cx="2346960" cy="365125"/>
           </a:xfrm>
           <a:prstGeom prst="rect">
             <a:avLst/>
@@ -2736,7 +2736,7 @@
           <a:p>
             <a:fld id="{E44376AC-B3C2-8643-B9A3-A6905164CDF3}" type="datetimeFigureOut">
               <a:rPr lang="en-US" smtClean="0"/>
-              <a:t>7/14/2016</a:t>
+              <a:t>8/18/2016</a:t>
             </a:fld>
             <a:endParaRPr lang="en-US"/>
           </a:p>
@@ -2754,8 +2754,8 @@
         </p:nvSpPr>
         <p:spPr>
           <a:xfrm>
-            <a:off x="3124200" y="6356350"/>
-            <a:ext cx="2895600" cy="365125"/>
+            <a:off x="3436620" y="6356353"/>
+            <a:ext cx="3185160" cy="365125"/>
           </a:xfrm>
           <a:prstGeom prst="rect">
             <a:avLst/>
@@ -2791,8 +2791,8 @@
         </p:nvSpPr>
         <p:spPr>
           <a:xfrm>
-            <a:off x="6553200" y="6356350"/>
-            <a:ext cx="2133600" cy="365125"/>
+            <a:off x="7208520" y="6356353"/>
+            <a:ext cx="2346960" cy="365125"/>
           </a:xfrm>
           <a:prstGeom prst="rect">
             <a:avLst/>
@@ -3119,7 +3119,7 @@
         </p:nvSpPr>
         <p:spPr>
           <a:xfrm>
-            <a:off x="195825" y="668709"/>
+            <a:off x="322830" y="668712"/>
             <a:ext cx="1846930" cy="461665"/>
           </a:xfrm>
           <a:prstGeom prst="rect">
@@ -3147,7 +3147,7 @@
               <a:t>m</a:t>
             </a:r>
             <a:r>
-              <a:rPr lang="en-US" sz="1200" dirty="0" smtClean="0">
+              <a:rPr lang="en-US" sz="1200" dirty="0">
                 <a:latin typeface="Courier New"/>
                 <a:cs typeface="Courier New"/>
               </a:rPr>
@@ -3157,14 +3157,14 @@
           <a:p>
             <a:pPr algn="ctr"/>
             <a:r>
-              <a:rPr lang="en-US" sz="1200" dirty="0" smtClean="0">
+              <a:rPr lang="en-US" sz="1200" dirty="0">
                 <a:latin typeface="Courier New"/>
                 <a:cs typeface="Courier New"/>
               </a:rPr>
               <a:t>(</a:t>
             </a:r>
             <a:r>
-              <a:rPr lang="en-US" sz="1200" dirty="0" smtClean="0">
+              <a:rPr lang="en-US" sz="1200" dirty="0">
                 <a:solidFill>
                   <a:srgbClr val="558ED5"/>
                 </a:solidFill>
@@ -3174,7 +3174,7 @@
               <a:t>unsigned char</a:t>
             </a:r>
             <a:r>
-              <a:rPr lang="en-US" sz="1200" dirty="0" smtClean="0">
+              <a:rPr lang="en-US" sz="1200" dirty="0">
                 <a:latin typeface="Courier New"/>
                 <a:cs typeface="Courier New"/>
               </a:rPr>
@@ -3195,7 +3195,7 @@
         </p:nvSpPr>
         <p:spPr>
           <a:xfrm>
-            <a:off x="2042755" y="668709"/>
+            <a:off x="2169760" y="668712"/>
             <a:ext cx="923450" cy="461665"/>
           </a:xfrm>
           <a:prstGeom prst="rect">
@@ -3216,7 +3216,7 @@
           <a:p>
             <a:pPr algn="ctr"/>
             <a:r>
-              <a:rPr lang="en-US" sz="1200" dirty="0" smtClean="0">
+              <a:rPr lang="en-US" sz="1200" dirty="0">
                 <a:latin typeface="Courier New"/>
                 <a:cs typeface="Courier New"/>
               </a:rPr>
@@ -3226,14 +3226,14 @@
           <a:p>
             <a:pPr algn="ctr"/>
             <a:r>
-              <a:rPr lang="en-US" sz="1200" dirty="0" smtClean="0">
+              <a:rPr lang="en-US" sz="1200" dirty="0">
                 <a:latin typeface="Courier New"/>
                 <a:cs typeface="Courier New"/>
               </a:rPr>
               <a:t>(</a:t>
             </a:r>
             <a:r>
-              <a:rPr lang="en-US" sz="1200" dirty="0" smtClean="0">
+              <a:rPr lang="en-US" sz="1200" dirty="0">
                 <a:solidFill>
                   <a:schemeClr val="tx2">
                     <a:lumMod val="60000"/>
@@ -3246,7 +3246,7 @@
               <a:t>uint32</a:t>
             </a:r>
             <a:r>
-              <a:rPr lang="en-US" sz="1200" dirty="0" smtClean="0">
+              <a:rPr lang="en-US" sz="1200" dirty="0">
                 <a:latin typeface="Courier New"/>
                 <a:cs typeface="Courier New"/>
               </a:rPr>
@@ -3267,8 +3267,8 @@
         </p:nvCxnSpPr>
         <p:spPr>
           <a:xfrm>
-            <a:off x="195825" y="405940"/>
-            <a:ext cx="5182314" cy="0"/>
+            <a:off x="322833" y="405940"/>
+            <a:ext cx="9274727" cy="0"/>
           </a:xfrm>
           <a:prstGeom prst="straightConnector1">
             <a:avLst/>
@@ -3304,8 +3304,8 @@
         </p:nvSpPr>
         <p:spPr>
           <a:xfrm>
-            <a:off x="1253554" y="128941"/>
-            <a:ext cx="3066865" cy="276999"/>
+            <a:off x="4022311" y="128944"/>
+            <a:ext cx="1486304" cy="276999"/>
           </a:xfrm>
           <a:prstGeom prst="rect">
             <a:avLst/>
@@ -3324,11 +3324,11 @@
           <a:p>
             <a:pPr algn="ctr"/>
             <a:r>
-              <a:rPr lang="en-US" sz="1200" dirty="0" smtClean="0">
+              <a:rPr lang="en-US" sz="1200" dirty="0">
                 <a:latin typeface="Courier New"/>
                 <a:cs typeface="Courier New"/>
               </a:rPr>
-              <a:t>24-byte header (first 16 bytes)</a:t>
+              <a:t>20-byte header</a:t>
             </a:r>
             <a:endParaRPr lang="en-US" sz="1200" dirty="0">
               <a:latin typeface="Courier New"/>
@@ -3339,85 +3339,13 @@
       </p:sp>
       <p:sp>
         <p:nvSpPr>
-          <p:cNvPr id="18" name="TextBox 17"/>
-          <p:cNvSpPr txBox="1"/>
-          <p:nvPr/>
-        </p:nvSpPr>
-        <p:spPr>
-          <a:xfrm>
-            <a:off x="195825" y="1898718"/>
-            <a:ext cx="2416046" cy="461665"/>
-          </a:xfrm>
-          <a:prstGeom prst="rect">
-            <a:avLst/>
-          </a:prstGeom>
-          <a:noFill/>
-          <a:ln w="12700" cmpd="sng">
-            <a:solidFill>
-              <a:schemeClr val="tx1"/>
-            </a:solidFill>
-          </a:ln>
-        </p:spPr>
-        <p:txBody>
-          <a:bodyPr wrap="none" rtlCol="0">
-            <a:spAutoFit/>
-          </a:bodyPr>
-          <a:lstStyle/>
-          <a:p>
-            <a:pPr algn="ctr"/>
-            <a:r>
-              <a:rPr lang="en-US" sz="1200" dirty="0" smtClean="0">
-                <a:latin typeface="Courier New"/>
-                <a:cs typeface="Courier New"/>
-              </a:rPr>
-              <a:t>batchTableJSONByteLength</a:t>
-            </a:r>
-          </a:p>
-          <a:p>
-            <a:pPr algn="ctr"/>
-            <a:r>
-              <a:rPr lang="en-US" sz="1200" dirty="0" smtClean="0">
-                <a:latin typeface="Courier New"/>
-                <a:cs typeface="Courier New"/>
-              </a:rPr>
-              <a:t>(</a:t>
-            </a:r>
-            <a:r>
-              <a:rPr lang="en-US" sz="1200" dirty="0" smtClean="0">
-                <a:solidFill>
-                  <a:schemeClr val="tx2">
-                    <a:lumMod val="60000"/>
-                    <a:lumOff val="40000"/>
-                  </a:schemeClr>
-                </a:solidFill>
-                <a:latin typeface="Courier New"/>
-                <a:cs typeface="Courier New"/>
-              </a:rPr>
-              <a:t>uint32</a:t>
-            </a:r>
-            <a:r>
-              <a:rPr lang="en-US" sz="1200" dirty="0" smtClean="0">
-                <a:latin typeface="Courier New"/>
-                <a:cs typeface="Courier New"/>
-              </a:rPr>
-              <a:t>)</a:t>
-            </a:r>
-            <a:endParaRPr lang="en-US" sz="1200" dirty="0">
-              <a:latin typeface="Courier New"/>
-              <a:cs typeface="Courier New"/>
-            </a:endParaRPr>
-          </a:p>
-        </p:txBody>
-      </p:sp>
-      <p:sp>
-        <p:nvSpPr>
           <p:cNvPr id="12" name="TextBox 11"/>
           <p:cNvSpPr txBox="1"/>
           <p:nvPr/>
         </p:nvSpPr>
         <p:spPr>
           <a:xfrm>
-            <a:off x="2966205" y="668709"/>
+            <a:off x="3093210" y="668712"/>
             <a:ext cx="1114408" cy="461665"/>
           </a:xfrm>
           <a:prstGeom prst="rect">
@@ -3438,7 +3366,7 @@
           <a:p>
             <a:pPr algn="ctr"/>
             <a:r>
-              <a:rPr lang="en-US" sz="1200" dirty="0" smtClean="0">
+              <a:rPr lang="en-US" sz="1200" dirty="0">
                 <a:latin typeface="Courier New"/>
                 <a:cs typeface="Courier New"/>
               </a:rPr>
@@ -3448,14 +3376,14 @@
           <a:p>
             <a:pPr algn="ctr"/>
             <a:r>
-              <a:rPr lang="en-US" sz="1200" dirty="0" smtClean="0">
+              <a:rPr lang="en-US" sz="1200" dirty="0">
                 <a:latin typeface="Courier New"/>
                 <a:cs typeface="Courier New"/>
               </a:rPr>
               <a:t>(</a:t>
             </a:r>
             <a:r>
-              <a:rPr lang="en-US" sz="1200" dirty="0" smtClean="0">
+              <a:rPr lang="en-US" sz="1200" dirty="0">
                 <a:solidFill>
                   <a:schemeClr val="tx2">
                     <a:lumMod val="60000"/>
@@ -3468,7 +3396,7 @@
               <a:t>uint32</a:t>
             </a:r>
             <a:r>
-              <a:rPr lang="en-US" sz="1200" dirty="0" smtClean="0">
+              <a:rPr lang="en-US" sz="1200" dirty="0">
                 <a:latin typeface="Courier New"/>
                 <a:cs typeface="Courier New"/>
               </a:rPr>
@@ -3489,8 +3417,8 @@
         </p:nvSpPr>
         <p:spPr>
           <a:xfrm>
-            <a:off x="4077782" y="668709"/>
-            <a:ext cx="1300357" cy="461665"/>
+            <a:off x="4207621" y="668712"/>
+            <a:ext cx="2601995" cy="461665"/>
           </a:xfrm>
           <a:prstGeom prst="rect">
             <a:avLst/>
@@ -3510,24 +3438,24 @@
           <a:p>
             <a:pPr algn="ctr"/>
             <a:r>
-              <a:rPr lang="en-US" sz="1200" dirty="0" smtClean="0">
+              <a:rPr lang="en-US" sz="1200" dirty="0">
                 <a:latin typeface="Courier New"/>
                 <a:cs typeface="Courier New"/>
               </a:rPr>
-              <a:t>pointsLength</a:t>
+              <a:t>featureTableJSONByteLength</a:t>
             </a:r>
           </a:p>
           <a:p>
             <a:pPr algn="ctr"/>
             <a:r>
-              <a:rPr lang="en-US" sz="1200" dirty="0" smtClean="0">
+              <a:rPr lang="en-US" sz="1200" dirty="0">
                 <a:latin typeface="Courier New"/>
                 <a:cs typeface="Courier New"/>
               </a:rPr>
               <a:t>(</a:t>
             </a:r>
             <a:r>
-              <a:rPr lang="en-US" sz="1200" dirty="0" smtClean="0">
+              <a:rPr lang="en-US" sz="1200" dirty="0">
                 <a:solidFill>
                   <a:schemeClr val="tx2">
                     <a:lumMod val="60000"/>
@@ -3540,7 +3468,7 @@
               <a:t>uint32</a:t>
             </a:r>
             <a:r>
-              <a:rPr lang="en-US" sz="1200" dirty="0" smtClean="0">
+              <a:rPr lang="en-US" sz="1200" dirty="0">
                 <a:latin typeface="Courier New"/>
                 <a:cs typeface="Courier New"/>
               </a:rPr>
@@ -3555,14 +3483,14 @@
       </p:sp>
       <p:cxnSp>
         <p:nvCxnSpPr>
-          <p:cNvPr id="16" name="Straight Arrow Connector 15"/>
+          <p:cNvPr id="24" name="Straight Arrow Connector 23"/>
           <p:cNvCxnSpPr/>
           <p:nvPr/>
         </p:nvCxnSpPr>
         <p:spPr>
           <a:xfrm>
-            <a:off x="81281" y="3181496"/>
-            <a:ext cx="4748079" cy="0"/>
+            <a:off x="321755" y="1704068"/>
+            <a:ext cx="1326348" cy="0"/>
           </a:xfrm>
           <a:prstGeom prst="straightConnector1">
             <a:avLst/>
@@ -3592,13 +3520,13 @@
       </p:cxnSp>
       <p:sp>
         <p:nvSpPr>
-          <p:cNvPr id="17" name="TextBox 16"/>
+          <p:cNvPr id="25" name="TextBox 24"/>
           <p:cNvSpPr txBox="1"/>
           <p:nvPr/>
         </p:nvSpPr>
         <p:spPr>
           <a:xfrm>
-            <a:off x="2177039" y="2842000"/>
+            <a:off x="689735" y="1427072"/>
             <a:ext cx="556563" cy="276999"/>
           </a:xfrm>
           <a:prstGeom prst="rect">
@@ -3611,14 +3539,14 @@
           </a:ln>
         </p:spPr>
         <p:txBody>
-          <a:bodyPr wrap="square" rtlCol="0">
+          <a:bodyPr wrap="none" rtlCol="0">
             <a:spAutoFit/>
           </a:bodyPr>
           <a:lstStyle/>
           <a:p>
             <a:pPr algn="ctr"/>
             <a:r>
-              <a:rPr lang="en-US" sz="1200" dirty="0" smtClean="0">
+              <a:rPr lang="en-US" sz="1200" dirty="0">
                 <a:latin typeface="Courier New"/>
                 <a:cs typeface="Courier New"/>
               </a:rPr>
@@ -3633,14 +3561,14 @@
       </p:sp>
       <p:sp>
         <p:nvSpPr>
-          <p:cNvPr id="20" name="TextBox 19"/>
+          <p:cNvPr id="19" name="TextBox 18"/>
           <p:cNvSpPr txBox="1"/>
           <p:nvPr/>
         </p:nvSpPr>
         <p:spPr>
           <a:xfrm>
-            <a:off x="81281" y="3433916"/>
-            <a:ext cx="1579278" cy="461665"/>
+            <a:off x="6809613" y="668711"/>
+            <a:ext cx="2787944" cy="461665"/>
           </a:xfrm>
           <a:prstGeom prst="rect">
             <a:avLst/>
@@ -3660,89 +3588,24 @@
           <a:p>
             <a:pPr algn="ctr"/>
             <a:r>
-              <a:rPr lang="en-US" sz="1200" dirty="0" smtClean="0">
+              <a:rPr lang="en-US" sz="1200" dirty="0">
                 <a:latin typeface="Courier New"/>
                 <a:cs typeface="Courier New"/>
               </a:rPr>
-              <a:t>positions[]</a:t>
+              <a:t>featureTableBinaryByteLength</a:t>
             </a:r>
           </a:p>
           <a:p>
             <a:pPr algn="ctr"/>
             <a:r>
-              <a:rPr lang="en-US" sz="1200" dirty="0" smtClean="0">
-                <a:solidFill>
-                  <a:schemeClr val="tx2">
-                    <a:lumMod val="60000"/>
-                    <a:lumOff val="40000"/>
-                  </a:schemeClr>
-                </a:solidFill>
-                <a:latin typeface="Courier New"/>
-                <a:cs typeface="Courier New"/>
-              </a:rPr>
-              <a:t>float32 </a:t>
-            </a:r>
-            <a:r>
-              <a:rPr lang="en-US" sz="1200" dirty="0" smtClean="0">
-                <a:latin typeface="Courier New"/>
-                <a:cs typeface="Courier New"/>
-              </a:rPr>
-              <a:t>x, y, z</a:t>
-            </a:r>
-            <a:endParaRPr lang="en-US" sz="1200" dirty="0">
-              <a:latin typeface="Courier New"/>
-              <a:cs typeface="Courier New"/>
-            </a:endParaRPr>
-          </a:p>
-        </p:txBody>
-      </p:sp>
-      <p:sp>
-        <p:nvSpPr>
-          <p:cNvPr id="23" name="TextBox 22"/>
-          <p:cNvSpPr txBox="1"/>
-          <p:nvPr/>
-        </p:nvSpPr>
-        <p:spPr>
-          <a:xfrm>
-            <a:off x="2611871" y="1898718"/>
-            <a:ext cx="2601995" cy="461665"/>
-          </a:xfrm>
-          <a:prstGeom prst="rect">
-            <a:avLst/>
-          </a:prstGeom>
-          <a:noFill/>
-          <a:ln w="12700" cmpd="sng">
-            <a:solidFill>
-              <a:schemeClr val="tx1"/>
-            </a:solidFill>
-          </a:ln>
-        </p:spPr>
-        <p:txBody>
-          <a:bodyPr wrap="none" rtlCol="0">
-            <a:spAutoFit/>
-          </a:bodyPr>
-          <a:lstStyle/>
-          <a:p>
-            <a:pPr algn="ctr"/>
-            <a:r>
-              <a:rPr lang="en-US" sz="1200" dirty="0" smtClean="0">
-                <a:latin typeface="Courier New"/>
-                <a:cs typeface="Courier New"/>
-              </a:rPr>
-              <a:t>batchTableBinaryByteLength</a:t>
-            </a:r>
-          </a:p>
-          <a:p>
-            <a:pPr algn="ctr"/>
-            <a:r>
-              <a:rPr lang="en-US" sz="1200" dirty="0" smtClean="0">
+              <a:rPr lang="en-US" sz="1200" dirty="0">
                 <a:latin typeface="Courier New"/>
                 <a:cs typeface="Courier New"/>
               </a:rPr>
               <a:t>(</a:t>
             </a:r>
             <a:r>
-              <a:rPr lang="en-US" sz="1200" dirty="0" smtClean="0">
+              <a:rPr lang="en-US" sz="1200" dirty="0">
                 <a:solidFill>
                   <a:schemeClr val="tx2">
                     <a:lumMod val="60000"/>
@@ -3755,7 +3618,7 @@
               <a:t>uint32</a:t>
             </a:r>
             <a:r>
-              <a:rPr lang="en-US" sz="1200" dirty="0" smtClean="0">
+              <a:rPr lang="en-US" sz="1200" dirty="0">
                 <a:latin typeface="Courier New"/>
                 <a:cs typeface="Courier New"/>
               </a:rPr>
@@ -3768,101 +3631,16 @@
           </a:p>
         </p:txBody>
       </p:sp>
-      <p:cxnSp>
-        <p:nvCxnSpPr>
-          <p:cNvPr id="24" name="Straight Arrow Connector 23"/>
-          <p:cNvCxnSpPr/>
+      <p:sp>
+        <p:nvSpPr>
+          <p:cNvPr id="29" name="TextBox 28"/>
+          <p:cNvSpPr txBox="1"/>
           <p:nvPr/>
-        </p:nvCxnSpPr>
+        </p:nvSpPr>
         <p:spPr>
           <a:xfrm>
-            <a:off x="194750" y="1704068"/>
-            <a:ext cx="5019116" cy="0"/>
-          </a:xfrm>
-          <a:prstGeom prst="straightConnector1">
-            <a:avLst/>
-          </a:prstGeom>
-          <a:ln w="12700" cmpd="sng">
-            <a:solidFill>
-              <a:schemeClr val="tx1"/>
-            </a:solidFill>
-            <a:headEnd type="arrow"/>
-            <a:tailEnd type="arrow"/>
-          </a:ln>
-        </p:spPr>
-        <p:style>
-          <a:lnRef idx="2">
-            <a:schemeClr val="accent1"/>
-          </a:lnRef>
-          <a:fillRef idx="0">
-            <a:schemeClr val="accent1"/>
-          </a:fillRef>
-          <a:effectRef idx="1">
-            <a:schemeClr val="accent1"/>
-          </a:effectRef>
-          <a:fontRef idx="minor">
-            <a:schemeClr val="tx1"/>
-          </a:fontRef>
-        </p:style>
-      </p:cxnSp>
-      <p:sp>
-        <p:nvSpPr>
-          <p:cNvPr id="25" name="TextBox 24"/>
-          <p:cNvSpPr txBox="1"/>
-          <p:nvPr/>
-        </p:nvSpPr>
-        <p:spPr>
-          <a:xfrm>
-            <a:off x="1345452" y="1427069"/>
-            <a:ext cx="2880918" cy="276999"/>
-          </a:xfrm>
-          <a:prstGeom prst="rect">
-            <a:avLst/>
-          </a:prstGeom>
-          <a:noFill/>
-          <a:ln w="12700" cmpd="sng">
-            <a:noFill/>
-            <a:prstDash val="lgDash"/>
-          </a:ln>
-        </p:spPr>
-        <p:txBody>
-          <a:bodyPr wrap="none" rtlCol="0">
-            <a:spAutoFit/>
-          </a:bodyPr>
-          <a:lstStyle/>
-          <a:p>
-            <a:pPr algn="ctr"/>
-            <a:r>
-              <a:rPr lang="en-US" sz="1200" dirty="0">
-                <a:latin typeface="Courier New"/>
-                <a:cs typeface="Courier New"/>
-              </a:rPr>
-              <a:t>24-byte header </a:t>
-            </a:r>
-            <a:r>
-              <a:rPr lang="en-US" sz="1200" dirty="0" smtClean="0">
-                <a:latin typeface="Courier New"/>
-                <a:cs typeface="Courier New"/>
-              </a:rPr>
-              <a:t>(next 8 bytes)</a:t>
-            </a:r>
-            <a:endParaRPr lang="en-US" sz="1200" dirty="0">
-              <a:latin typeface="Courier New"/>
-              <a:cs typeface="Courier New"/>
-            </a:endParaRPr>
-          </a:p>
-        </p:txBody>
-      </p:sp>
-      <p:sp>
-        <p:nvSpPr>
-          <p:cNvPr id="21" name="TextBox 20"/>
-          <p:cNvSpPr txBox="1"/>
-          <p:nvPr/>
-        </p:nvSpPr>
-        <p:spPr>
-          <a:xfrm>
-            <a:off x="1660559" y="3433916"/>
-            <a:ext cx="1486305" cy="461665"/>
+            <a:off x="347749" y="1973400"/>
+            <a:ext cx="1300357" cy="461665"/>
           </a:xfrm>
           <a:prstGeom prst="rect">
             <a:avLst/>
@@ -3883,12 +3661,16 @@
           <a:p>
             <a:pPr algn="ctr"/>
             <a:r>
-              <a:rPr lang="en-US" sz="1200" dirty="0" smtClean="0">
+              <a:rPr lang="en-US" sz="1200" dirty="0" err="1">
                 <a:latin typeface="Courier New"/>
                 <a:cs typeface="Courier New"/>
               </a:rPr>
-              <a:t>batchTableJSON</a:t>
-            </a:r>
+              <a:t>featureTable</a:t>
+            </a:r>
+            <a:endParaRPr lang="en-US" sz="1200" dirty="0">
+              <a:latin typeface="Courier New"/>
+              <a:cs typeface="Courier New"/>
+            </a:endParaRPr>
           </a:p>
           <a:p>
             <a:pPr algn="ctr"/>
@@ -3899,149 +3681,6 @@
           </a:p>
         </p:txBody>
       </p:sp>
-      <p:sp>
-        <p:nvSpPr>
-          <p:cNvPr id="22" name="TextBox 21"/>
-          <p:cNvSpPr txBox="1"/>
-          <p:nvPr/>
-        </p:nvSpPr>
-        <p:spPr>
-          <a:xfrm>
-            <a:off x="3146864" y="3433915"/>
-            <a:ext cx="1672253" cy="461665"/>
-          </a:xfrm>
-          <a:prstGeom prst="rect">
-            <a:avLst/>
-          </a:prstGeom>
-          <a:noFill/>
-          <a:ln w="12700" cmpd="sng">
-            <a:solidFill>
-              <a:schemeClr val="tx1"/>
-            </a:solidFill>
-            <a:prstDash val="lgDash"/>
-          </a:ln>
-        </p:spPr>
-        <p:txBody>
-          <a:bodyPr wrap="none" rtlCol="0">
-            <a:spAutoFit/>
-          </a:bodyPr>
-          <a:lstStyle/>
-          <a:p>
-            <a:pPr algn="ctr"/>
-            <a:r>
-              <a:rPr lang="en-US" sz="1200" dirty="0" smtClean="0">
-                <a:latin typeface="Courier New"/>
-                <a:cs typeface="Courier New"/>
-              </a:rPr>
-              <a:t>batchTableBinary</a:t>
-            </a:r>
-          </a:p>
-          <a:p>
-            <a:pPr algn="ctr"/>
-            <a:endParaRPr lang="en-US" sz="1200" dirty="0">
-              <a:latin typeface="Courier New"/>
-              <a:cs typeface="Courier New"/>
-            </a:endParaRPr>
-          </a:p>
-        </p:txBody>
-      </p:sp>
-      <p:sp>
-        <p:nvSpPr>
-          <p:cNvPr id="27" name="TextBox 26"/>
-          <p:cNvSpPr txBox="1"/>
-          <p:nvPr/>
-        </p:nvSpPr>
-        <p:spPr>
-          <a:xfrm>
-            <a:off x="-62395" y="4188911"/>
-            <a:ext cx="3660521" cy="276999"/>
-          </a:xfrm>
-          <a:prstGeom prst="rect">
-            <a:avLst/>
-          </a:prstGeom>
-          <a:noFill/>
-          <a:ln w="12700" cmpd="sng">
-            <a:noFill/>
-            <a:prstDash val="lgDash"/>
-          </a:ln>
-        </p:spPr>
-        <p:txBody>
-          <a:bodyPr wrap="square" rtlCol="0">
-            <a:spAutoFit/>
-          </a:bodyPr>
-          <a:lstStyle/>
-          <a:p>
-            <a:r>
-              <a:rPr lang="en-US" sz="1200" dirty="0" smtClean="0">
-                <a:latin typeface="Courier New"/>
-                <a:cs typeface="Courier New"/>
-              </a:rPr>
-              <a:t>4-byte (</a:t>
-            </a:r>
-            <a:r>
-              <a:rPr lang="en-US" sz="1200" dirty="0" smtClean="0">
-                <a:solidFill>
-                  <a:schemeClr val="tx2">
-                    <a:lumMod val="60000"/>
-                    <a:lumOff val="40000"/>
-                  </a:schemeClr>
-                </a:solidFill>
-                <a:latin typeface="Courier New"/>
-                <a:cs typeface="Courier New"/>
-              </a:rPr>
-              <a:t>float32</a:t>
-            </a:r>
-            <a:r>
-              <a:rPr lang="en-US" sz="1200" dirty="0" smtClean="0">
-                <a:latin typeface="Courier New"/>
-                <a:cs typeface="Courier New"/>
-              </a:rPr>
-              <a:t>) aligned arraybuffer</a:t>
-            </a:r>
-            <a:endParaRPr lang="en-US" sz="1200" dirty="0">
-              <a:latin typeface="Courier New"/>
-              <a:cs typeface="Courier New"/>
-            </a:endParaRPr>
-          </a:p>
-        </p:txBody>
-      </p:sp>
-      <p:cxnSp>
-        <p:nvCxnSpPr>
-          <p:cNvPr id="28" name="Straight Arrow Connector 27"/>
-          <p:cNvCxnSpPr/>
-          <p:nvPr/>
-        </p:nvCxnSpPr>
-        <p:spPr>
-          <a:xfrm flipV="1">
-            <a:off x="86151" y="3895581"/>
-            <a:ext cx="0" cy="293330"/>
-          </a:xfrm>
-          <a:prstGeom prst="straightConnector1">
-            <a:avLst/>
-          </a:prstGeom>
-          <a:ln w="12700" cmpd="sng">
-            <a:solidFill>
-              <a:schemeClr val="tx1"/>
-            </a:solidFill>
-            <a:headEnd type="none" w="med" len="med"/>
-            <a:tailEnd type="arrow" w="med" len="med"/>
-          </a:ln>
-        </p:spPr>
-        <p:style>
-          <a:lnRef idx="2">
-            <a:schemeClr val="accent1"/>
-          </a:lnRef>
-          <a:fillRef idx="0">
-            <a:schemeClr val="accent1"/>
-          </a:fillRef>
-          <a:effectRef idx="1">
-            <a:schemeClr val="accent1"/>
-          </a:effectRef>
-          <a:fontRef idx="minor">
-            <a:schemeClr val="tx1"/>
-          </a:fontRef>
-        </p:style>
-      </p:cxnSp>
     </p:spTree>
     <p:extLst>
       <p:ext uri="{BB962C8B-B14F-4D97-AF65-F5344CB8AC3E}">
@@ -4052,6 +3691,13 @@
   <p:clrMapOvr>
     <a:masterClrMapping/>
   </p:clrMapOvr>
+  <p:timing>
+    <p:tnLst>
+      <p:par>
+        <p:cTn id="1" dur="indefinite" restart="never" nodeType="tmRoot"/>
+      </p:par>
+    </p:tnLst>
+  </p:timing>
 </p:sld>
 </file>
 

</xml_diff>